<commit_message>
updating data splitting plan
</commit_message>
<xml_diff>
--- a/notes/data_splitting_plan.pptx
+++ b/notes/data_splitting_plan.pptx
@@ -104,6 +104,11 @@
       </a:defRPr>
     </a:lvl9pPr>
   </p:defaultTextStyle>
+  <p:extLst>
+    <p:ext uri="{EFAFB233-063F-42B5-8137-9DF3F51BA10A}">
+      <p15:sldGuideLst xmlns:p15="http://schemas.microsoft.com/office/powerpoint/2012/main"/>
+    </p:ext>
+  </p:extLst>
 </p:presentation>
 </file>
 
@@ -3323,10 +3328,10 @@
       </p:grpSpPr>
       <p:grpSp>
         <p:nvGrpSpPr>
-          <p:cNvPr id="28" name="Group 27">
-            <a:extLst>
-              <a:ext uri="{FF2B5EF4-FFF2-40B4-BE49-F238E27FC236}">
-                <a16:creationId xmlns:a16="http://schemas.microsoft.com/office/drawing/2014/main" id="{47C78B9E-8810-AABB-9760-B4B160CD4C29}"/>
+          <p:cNvPr id="5" name="Group 4">
+            <a:extLst>
+              <a:ext uri="{FF2B5EF4-FFF2-40B4-BE49-F238E27FC236}">
+                <a16:creationId xmlns:a16="http://schemas.microsoft.com/office/drawing/2014/main" id="{915372E3-DC97-4482-9C0C-01C448BCFF3C}"/>
               </a:ext>
             </a:extLst>
           </p:cNvPr>
@@ -3356,7 +3361,7 @@
           <p:spPr>
             <a:xfrm>
               <a:off x="2590802" y="1143000"/>
-              <a:ext cx="3657600" cy="2286000"/>
+              <a:ext cx="914400" cy="2286000"/>
             </a:xfrm>
             <a:prstGeom prst="rect">
               <a:avLst/>
@@ -3399,7 +3404,7 @@
                   <a:latin typeface="Arial" panose="020B0604020202020204" pitchFamily="34" charset="0"/>
                   <a:cs typeface="Arial" panose="020B0604020202020204" pitchFamily="34" charset="0"/>
                 </a:rPr>
-                <a:t>A</a:t>
+                <a:t>A1</a:t>
               </a:r>
             </a:p>
           </p:txBody>
@@ -4089,6 +4094,195 @@
             </a:fontRef>
           </p:style>
         </p:cxnSp>
+        <p:sp>
+          <p:nvSpPr>
+            <p:cNvPr id="2" name="Rectangle 1">
+              <a:extLst>
+                <a:ext uri="{FF2B5EF4-FFF2-40B4-BE49-F238E27FC236}">
+                  <a16:creationId xmlns:a16="http://schemas.microsoft.com/office/drawing/2014/main" id="{30E87DAA-B050-977C-BC89-10EBB18ADAC7}"/>
+                </a:ext>
+              </a:extLst>
+            </p:cNvPr>
+            <p:cNvSpPr/>
+            <p:nvPr/>
+          </p:nvSpPr>
+          <p:spPr>
+            <a:xfrm>
+              <a:off x="3505199" y="1143000"/>
+              <a:ext cx="914400" cy="2286000"/>
+            </a:xfrm>
+            <a:prstGeom prst="rect">
+              <a:avLst/>
+            </a:prstGeom>
+            <a:solidFill>
+              <a:srgbClr val="76D6FF"/>
+            </a:solidFill>
+            <a:ln w="12700">
+              <a:solidFill>
+                <a:schemeClr val="tx1"/>
+              </a:solidFill>
+            </a:ln>
+          </p:spPr>
+          <p:style>
+            <a:lnRef idx="2">
+              <a:schemeClr val="accent5">
+                <a:shade val="50000"/>
+              </a:schemeClr>
+            </a:lnRef>
+            <a:fillRef idx="1">
+              <a:schemeClr val="accent5"/>
+            </a:fillRef>
+            <a:effectRef idx="0">
+              <a:schemeClr val="accent5"/>
+            </a:effectRef>
+            <a:fontRef idx="minor">
+              <a:schemeClr val="lt1"/>
+            </a:fontRef>
+          </p:style>
+          <p:txBody>
+            <a:bodyPr rtlCol="0" anchor="ctr"/>
+            <a:lstStyle/>
+            <a:p>
+              <a:pPr algn="ctr"/>
+              <a:r>
+                <a:rPr lang="en-US" sz="3000" dirty="0">
+                  <a:solidFill>
+                    <a:schemeClr val="bg1"/>
+                  </a:solidFill>
+                  <a:latin typeface="Arial" panose="020B0604020202020204" pitchFamily="34" charset="0"/>
+                  <a:cs typeface="Arial" panose="020B0604020202020204" pitchFamily="34" charset="0"/>
+                </a:rPr>
+                <a:t>A2</a:t>
+              </a:r>
+            </a:p>
+          </p:txBody>
+        </p:sp>
+        <p:sp>
+          <p:nvSpPr>
+            <p:cNvPr id="3" name="Rectangle 2">
+              <a:extLst>
+                <a:ext uri="{FF2B5EF4-FFF2-40B4-BE49-F238E27FC236}">
+                  <a16:creationId xmlns:a16="http://schemas.microsoft.com/office/drawing/2014/main" id="{B5FB2346-0D49-918A-4306-B975D682F3BE}"/>
+                </a:ext>
+              </a:extLst>
+            </p:cNvPr>
+            <p:cNvSpPr/>
+            <p:nvPr/>
+          </p:nvSpPr>
+          <p:spPr>
+            <a:xfrm>
+              <a:off x="4419596" y="1142999"/>
+              <a:ext cx="914400" cy="2286000"/>
+            </a:xfrm>
+            <a:prstGeom prst="rect">
+              <a:avLst/>
+            </a:prstGeom>
+            <a:solidFill>
+              <a:srgbClr val="76D6FF"/>
+            </a:solidFill>
+            <a:ln w="12700">
+              <a:solidFill>
+                <a:schemeClr val="tx1"/>
+              </a:solidFill>
+            </a:ln>
+          </p:spPr>
+          <p:style>
+            <a:lnRef idx="2">
+              <a:schemeClr val="accent5">
+                <a:shade val="50000"/>
+              </a:schemeClr>
+            </a:lnRef>
+            <a:fillRef idx="1">
+              <a:schemeClr val="accent5"/>
+            </a:fillRef>
+            <a:effectRef idx="0">
+              <a:schemeClr val="accent5"/>
+            </a:effectRef>
+            <a:fontRef idx="minor">
+              <a:schemeClr val="lt1"/>
+            </a:fontRef>
+          </p:style>
+          <p:txBody>
+            <a:bodyPr rtlCol="0" anchor="ctr"/>
+            <a:lstStyle/>
+            <a:p>
+              <a:pPr algn="ctr"/>
+              <a:r>
+                <a:rPr lang="en-US" sz="3000" dirty="0">
+                  <a:solidFill>
+                    <a:schemeClr val="bg1"/>
+                  </a:solidFill>
+                  <a:latin typeface="Arial" panose="020B0604020202020204" pitchFamily="34" charset="0"/>
+                  <a:cs typeface="Arial" panose="020B0604020202020204" pitchFamily="34" charset="0"/>
+                </a:rPr>
+                <a:t>A3</a:t>
+              </a:r>
+            </a:p>
+          </p:txBody>
+        </p:sp>
+        <p:sp>
+          <p:nvSpPr>
+            <p:cNvPr id="4" name="Rectangle 3">
+              <a:extLst>
+                <a:ext uri="{FF2B5EF4-FFF2-40B4-BE49-F238E27FC236}">
+                  <a16:creationId xmlns:a16="http://schemas.microsoft.com/office/drawing/2014/main" id="{6B8509A6-63A4-5896-7429-907CA969CE06}"/>
+                </a:ext>
+              </a:extLst>
+            </p:cNvPr>
+            <p:cNvSpPr/>
+            <p:nvPr/>
+          </p:nvSpPr>
+          <p:spPr>
+            <a:xfrm>
+              <a:off x="5333993" y="1142999"/>
+              <a:ext cx="914400" cy="2286000"/>
+            </a:xfrm>
+            <a:prstGeom prst="rect">
+              <a:avLst/>
+            </a:prstGeom>
+            <a:solidFill>
+              <a:srgbClr val="76D6FF"/>
+            </a:solidFill>
+            <a:ln w="12700">
+              <a:solidFill>
+                <a:schemeClr val="tx1"/>
+              </a:solidFill>
+            </a:ln>
+          </p:spPr>
+          <p:style>
+            <a:lnRef idx="2">
+              <a:schemeClr val="accent5">
+                <a:shade val="50000"/>
+              </a:schemeClr>
+            </a:lnRef>
+            <a:fillRef idx="1">
+              <a:schemeClr val="accent5"/>
+            </a:fillRef>
+            <a:effectRef idx="0">
+              <a:schemeClr val="accent5"/>
+            </a:effectRef>
+            <a:fontRef idx="minor">
+              <a:schemeClr val="lt1"/>
+            </a:fontRef>
+          </p:style>
+          <p:txBody>
+            <a:bodyPr rtlCol="0" anchor="ctr"/>
+            <a:lstStyle/>
+            <a:p>
+              <a:pPr algn="ctr"/>
+              <a:r>
+                <a:rPr lang="en-US" sz="3000" dirty="0">
+                  <a:solidFill>
+                    <a:schemeClr val="bg1"/>
+                  </a:solidFill>
+                  <a:latin typeface="Arial" panose="020B0604020202020204" pitchFamily="34" charset="0"/>
+                  <a:cs typeface="Arial" panose="020B0604020202020204" pitchFamily="34" charset="0"/>
+                </a:rPr>
+                <a:t>A4</a:t>
+              </a:r>
+            </a:p>
+          </p:txBody>
+        </p:sp>
       </p:grpSp>
     </p:spTree>
     <p:extLst>

</xml_diff>

<commit_message>
updating data splitting plan again
</commit_message>
<xml_diff>
--- a/notes/data_splitting_plan.pptx
+++ b/notes/data_splitting_plan.pptx
@@ -3328,10 +3328,10 @@
       </p:grpSpPr>
       <p:grpSp>
         <p:nvGrpSpPr>
-          <p:cNvPr id="5" name="Group 4">
-            <a:extLst>
-              <a:ext uri="{FF2B5EF4-FFF2-40B4-BE49-F238E27FC236}">
-                <a16:creationId xmlns:a16="http://schemas.microsoft.com/office/drawing/2014/main" id="{915372E3-DC97-4482-9C0C-01C448BCFF3C}"/>
+          <p:cNvPr id="11" name="Group 10">
+            <a:extLst>
+              <a:ext uri="{FF2B5EF4-FFF2-40B4-BE49-F238E27FC236}">
+                <a16:creationId xmlns:a16="http://schemas.microsoft.com/office/drawing/2014/main" id="{FDC4FF02-3238-4851-DC69-83DB1216E9EF}"/>
               </a:ext>
             </a:extLst>
           </p:cNvPr>
@@ -3361,7 +3361,7 @@
           <p:spPr>
             <a:xfrm>
               <a:off x="2590802" y="1143000"/>
-              <a:ext cx="914400" cy="2286000"/>
+              <a:ext cx="3657600" cy="2286000"/>
             </a:xfrm>
             <a:prstGeom prst="rect">
               <a:avLst/>
@@ -4094,195 +4094,6 @@
             </a:fontRef>
           </p:style>
         </p:cxnSp>
-        <p:sp>
-          <p:nvSpPr>
-            <p:cNvPr id="2" name="Rectangle 1">
-              <a:extLst>
-                <a:ext uri="{FF2B5EF4-FFF2-40B4-BE49-F238E27FC236}">
-                  <a16:creationId xmlns:a16="http://schemas.microsoft.com/office/drawing/2014/main" id="{30E87DAA-B050-977C-BC89-10EBB18ADAC7}"/>
-                </a:ext>
-              </a:extLst>
-            </p:cNvPr>
-            <p:cNvSpPr/>
-            <p:nvPr/>
-          </p:nvSpPr>
-          <p:spPr>
-            <a:xfrm>
-              <a:off x="3505199" y="1143000"/>
-              <a:ext cx="914400" cy="2286000"/>
-            </a:xfrm>
-            <a:prstGeom prst="rect">
-              <a:avLst/>
-            </a:prstGeom>
-            <a:solidFill>
-              <a:srgbClr val="76D6FF"/>
-            </a:solidFill>
-            <a:ln w="12700">
-              <a:solidFill>
-                <a:schemeClr val="tx1"/>
-              </a:solidFill>
-            </a:ln>
-          </p:spPr>
-          <p:style>
-            <a:lnRef idx="2">
-              <a:schemeClr val="accent5">
-                <a:shade val="50000"/>
-              </a:schemeClr>
-            </a:lnRef>
-            <a:fillRef idx="1">
-              <a:schemeClr val="accent5"/>
-            </a:fillRef>
-            <a:effectRef idx="0">
-              <a:schemeClr val="accent5"/>
-            </a:effectRef>
-            <a:fontRef idx="minor">
-              <a:schemeClr val="lt1"/>
-            </a:fontRef>
-          </p:style>
-          <p:txBody>
-            <a:bodyPr rtlCol="0" anchor="ctr"/>
-            <a:lstStyle/>
-            <a:p>
-              <a:pPr algn="ctr"/>
-              <a:r>
-                <a:rPr lang="en-US" sz="3000" dirty="0">
-                  <a:solidFill>
-                    <a:schemeClr val="bg1"/>
-                  </a:solidFill>
-                  <a:latin typeface="Arial" panose="020B0604020202020204" pitchFamily="34" charset="0"/>
-                  <a:cs typeface="Arial" panose="020B0604020202020204" pitchFamily="34" charset="0"/>
-                </a:rPr>
-                <a:t>A2</a:t>
-              </a:r>
-            </a:p>
-          </p:txBody>
-        </p:sp>
-        <p:sp>
-          <p:nvSpPr>
-            <p:cNvPr id="3" name="Rectangle 2">
-              <a:extLst>
-                <a:ext uri="{FF2B5EF4-FFF2-40B4-BE49-F238E27FC236}">
-                  <a16:creationId xmlns:a16="http://schemas.microsoft.com/office/drawing/2014/main" id="{B5FB2346-0D49-918A-4306-B975D682F3BE}"/>
-                </a:ext>
-              </a:extLst>
-            </p:cNvPr>
-            <p:cNvSpPr/>
-            <p:nvPr/>
-          </p:nvSpPr>
-          <p:spPr>
-            <a:xfrm>
-              <a:off x="4419596" y="1142999"/>
-              <a:ext cx="914400" cy="2286000"/>
-            </a:xfrm>
-            <a:prstGeom prst="rect">
-              <a:avLst/>
-            </a:prstGeom>
-            <a:solidFill>
-              <a:srgbClr val="76D6FF"/>
-            </a:solidFill>
-            <a:ln w="12700">
-              <a:solidFill>
-                <a:schemeClr val="tx1"/>
-              </a:solidFill>
-            </a:ln>
-          </p:spPr>
-          <p:style>
-            <a:lnRef idx="2">
-              <a:schemeClr val="accent5">
-                <a:shade val="50000"/>
-              </a:schemeClr>
-            </a:lnRef>
-            <a:fillRef idx="1">
-              <a:schemeClr val="accent5"/>
-            </a:fillRef>
-            <a:effectRef idx="0">
-              <a:schemeClr val="accent5"/>
-            </a:effectRef>
-            <a:fontRef idx="minor">
-              <a:schemeClr val="lt1"/>
-            </a:fontRef>
-          </p:style>
-          <p:txBody>
-            <a:bodyPr rtlCol="0" anchor="ctr"/>
-            <a:lstStyle/>
-            <a:p>
-              <a:pPr algn="ctr"/>
-              <a:r>
-                <a:rPr lang="en-US" sz="3000" dirty="0">
-                  <a:solidFill>
-                    <a:schemeClr val="bg1"/>
-                  </a:solidFill>
-                  <a:latin typeface="Arial" panose="020B0604020202020204" pitchFamily="34" charset="0"/>
-                  <a:cs typeface="Arial" panose="020B0604020202020204" pitchFamily="34" charset="0"/>
-                </a:rPr>
-                <a:t>A3</a:t>
-              </a:r>
-            </a:p>
-          </p:txBody>
-        </p:sp>
-        <p:sp>
-          <p:nvSpPr>
-            <p:cNvPr id="4" name="Rectangle 3">
-              <a:extLst>
-                <a:ext uri="{FF2B5EF4-FFF2-40B4-BE49-F238E27FC236}">
-                  <a16:creationId xmlns:a16="http://schemas.microsoft.com/office/drawing/2014/main" id="{6B8509A6-63A4-5896-7429-907CA969CE06}"/>
-                </a:ext>
-              </a:extLst>
-            </p:cNvPr>
-            <p:cNvSpPr/>
-            <p:nvPr/>
-          </p:nvSpPr>
-          <p:spPr>
-            <a:xfrm>
-              <a:off x="5333993" y="1142999"/>
-              <a:ext cx="914400" cy="2286000"/>
-            </a:xfrm>
-            <a:prstGeom prst="rect">
-              <a:avLst/>
-            </a:prstGeom>
-            <a:solidFill>
-              <a:srgbClr val="76D6FF"/>
-            </a:solidFill>
-            <a:ln w="12700">
-              <a:solidFill>
-                <a:schemeClr val="tx1"/>
-              </a:solidFill>
-            </a:ln>
-          </p:spPr>
-          <p:style>
-            <a:lnRef idx="2">
-              <a:schemeClr val="accent5">
-                <a:shade val="50000"/>
-              </a:schemeClr>
-            </a:lnRef>
-            <a:fillRef idx="1">
-              <a:schemeClr val="accent5"/>
-            </a:fillRef>
-            <a:effectRef idx="0">
-              <a:schemeClr val="accent5"/>
-            </a:effectRef>
-            <a:fontRef idx="minor">
-              <a:schemeClr val="lt1"/>
-            </a:fontRef>
-          </p:style>
-          <p:txBody>
-            <a:bodyPr rtlCol="0" anchor="ctr"/>
-            <a:lstStyle/>
-            <a:p>
-              <a:pPr algn="ctr"/>
-              <a:r>
-                <a:rPr lang="en-US" sz="3000" dirty="0">
-                  <a:solidFill>
-                    <a:schemeClr val="bg1"/>
-                  </a:solidFill>
-                  <a:latin typeface="Arial" panose="020B0604020202020204" pitchFamily="34" charset="0"/>
-                  <a:cs typeface="Arial" panose="020B0604020202020204" pitchFamily="34" charset="0"/>
-                </a:rPr>
-                <a:t>A4</a:t>
-              </a:r>
-            </a:p>
-          </p:txBody>
-        </p:sp>
       </p:grpSp>
     </p:spTree>
     <p:extLst>

</xml_diff>

<commit_message>
5-2 add basic RF and SVC without parameter tuning
</commit_message>
<xml_diff>
--- a/notes/data_splitting_plan.pptx
+++ b/notes/data_splitting_plan.pptx
@@ -3328,10 +3328,10 @@
       </p:grpSpPr>
       <p:grpSp>
         <p:nvGrpSpPr>
-          <p:cNvPr id="11" name="Group 10">
-            <a:extLst>
-              <a:ext uri="{FF2B5EF4-FFF2-40B4-BE49-F238E27FC236}">
-                <a16:creationId xmlns:a16="http://schemas.microsoft.com/office/drawing/2014/main" id="{FDC4FF02-3238-4851-DC69-83DB1216E9EF}"/>
+          <p:cNvPr id="3" name="Group 2">
+            <a:extLst>
+              <a:ext uri="{FF2B5EF4-FFF2-40B4-BE49-F238E27FC236}">
+                <a16:creationId xmlns:a16="http://schemas.microsoft.com/office/drawing/2014/main" id="{2EC5F632-B4A6-781D-6CBB-A2BC27738361}"/>
               </a:ext>
             </a:extLst>
           </p:cNvPr>
@@ -3340,10 +3340,10 @@
         </p:nvGrpSpPr>
         <p:grpSpPr>
           <a:xfrm>
-            <a:off x="971996" y="748686"/>
-            <a:ext cx="6952803" cy="5466275"/>
-            <a:chOff x="971996" y="748686"/>
-            <a:chExt cx="6952803" cy="5466275"/>
+            <a:off x="1018261" y="748686"/>
+            <a:ext cx="6911980" cy="2680314"/>
+            <a:chOff x="1018261" y="748686"/>
+            <a:chExt cx="6911980" cy="2680314"/>
           </a:xfrm>
         </p:grpSpPr>
         <p:sp>
@@ -3361,7 +3361,7 @@
           <p:spPr>
             <a:xfrm>
               <a:off x="2590802" y="1143000"/>
-              <a:ext cx="3657600" cy="2286000"/>
+              <a:ext cx="3657600" cy="914400"/>
             </a:xfrm>
             <a:prstGeom prst="rect">
               <a:avLst/>
@@ -3423,8 +3423,8 @@
           </p:nvSpPr>
           <p:spPr>
             <a:xfrm>
-              <a:off x="2590799" y="3429000"/>
-              <a:ext cx="914400" cy="2286000"/>
+              <a:off x="2590799" y="2057400"/>
+              <a:ext cx="914400" cy="914400"/>
             </a:xfrm>
             <a:prstGeom prst="rect">
               <a:avLst/>
@@ -3486,8 +3486,8 @@
           </p:nvSpPr>
           <p:spPr>
             <a:xfrm>
-              <a:off x="3505202" y="3429000"/>
-              <a:ext cx="914400" cy="2286000"/>
+              <a:off x="3505202" y="2057400"/>
+              <a:ext cx="914400" cy="914400"/>
             </a:xfrm>
             <a:prstGeom prst="rect">
               <a:avLst/>
@@ -3546,8 +3546,8 @@
           </p:nvSpPr>
           <p:spPr>
             <a:xfrm>
-              <a:off x="4419602" y="3429000"/>
-              <a:ext cx="914400" cy="2286000"/>
+              <a:off x="4419602" y="2057400"/>
+              <a:ext cx="914400" cy="914400"/>
             </a:xfrm>
             <a:prstGeom prst="rect">
               <a:avLst/>
@@ -3606,8 +3606,8 @@
           </p:nvSpPr>
           <p:spPr>
             <a:xfrm>
-              <a:off x="5334002" y="3429000"/>
-              <a:ext cx="914400" cy="2286000"/>
+              <a:off x="5334002" y="2057400"/>
+              <a:ext cx="914400" cy="914400"/>
             </a:xfrm>
             <a:prstGeom prst="rect">
               <a:avLst/>
@@ -3667,7 +3667,7 @@
           <p:spPr>
             <a:xfrm>
               <a:off x="6248402" y="1143000"/>
-              <a:ext cx="914400" cy="2286000"/>
+              <a:ext cx="914400" cy="914400"/>
             </a:xfrm>
             <a:prstGeom prst="rect">
               <a:avLst/>
@@ -3729,8 +3729,8 @@
           </p:nvSpPr>
           <p:spPr>
             <a:xfrm>
-              <a:off x="6248402" y="3429000"/>
-              <a:ext cx="914400" cy="2286000"/>
+              <a:off x="6248402" y="2057400"/>
+              <a:ext cx="914400" cy="914400"/>
             </a:xfrm>
             <a:prstGeom prst="rect">
               <a:avLst/>
@@ -3868,7 +3868,7 @@
           </p:nvSpPr>
           <p:spPr>
             <a:xfrm>
-              <a:off x="1241300" y="2124417"/>
+              <a:off x="1287565" y="1438617"/>
               <a:ext cx="1191352" cy="323165"/>
             </a:xfrm>
             <a:prstGeom prst="rect">
@@ -3907,7 +3907,7 @@
           </p:nvSpPr>
           <p:spPr>
             <a:xfrm>
-              <a:off x="971996" y="4410419"/>
+              <a:off x="1018261" y="2353017"/>
               <a:ext cx="1460656" cy="323165"/>
             </a:xfrm>
             <a:prstGeom prst="rect">
@@ -3941,13 +3941,15 @@
                 </a:ext>
               </a:extLst>
             </p:cNvPr>
-            <p:cNvCxnSpPr/>
+            <p:cNvCxnSpPr>
+              <a:cxnSpLocks/>
+            </p:cNvCxnSpPr>
             <p:nvPr/>
           </p:nvCxnSpPr>
           <p:spPr>
             <a:xfrm>
               <a:off x="7543800" y="1250153"/>
-              <a:ext cx="0" cy="4430486"/>
+              <a:ext cx="0" cy="1721647"/>
             </a:xfrm>
             <a:prstGeom prst="straightConnector1">
               <a:avLst/>
@@ -3985,7 +3987,7 @@
           </p:nvSpPr>
           <p:spPr>
             <a:xfrm rot="5400000">
-              <a:off x="6884770" y="3244334"/>
+              <a:off x="6890212" y="1872734"/>
               <a:ext cx="1710725" cy="369332"/>
             </a:xfrm>
             <a:prstGeom prst="rect">
@@ -4023,7 +4025,7 @@
           </p:nvSpPr>
           <p:spPr>
             <a:xfrm>
-              <a:off x="3207114" y="5845629"/>
+              <a:off x="3223442" y="3059668"/>
               <a:ext cx="3339376" cy="369332"/>
             </a:xfrm>
             <a:prstGeom prst="rect">
@@ -4063,7 +4065,7 @@
           </p:nvCxnSpPr>
           <p:spPr>
             <a:xfrm flipH="1">
-              <a:off x="2743203" y="6214961"/>
+              <a:off x="2759531" y="3429000"/>
               <a:ext cx="4267198" cy="0"/>
             </a:xfrm>
             <a:prstGeom prst="straightConnector1">

</xml_diff>